<commit_message>
fixed the details the directive gave us about the user interface
</commit_message>
<xml_diff>
--- a/Separation to classes.pptx
+++ b/Separation to classes.pptx
@@ -115,7 +115,7 @@
 
 <file path=ppt/commentAuthors.xml><?xml version="1.0" encoding="utf-8"?>
 <p:cmAuthorLst xmlns:a="http://schemas.openxmlformats.org/drawingml/2006/main" xmlns:r="http://schemas.openxmlformats.org/officeDocument/2006/relationships" xmlns:p="http://schemas.openxmlformats.org/presentationml/2006/main">
-  <p:cmAuthor id="1" name="sivan azari" initials="sa" lastIdx="15" clrIdx="0">
+  <p:cmAuthor id="1" name="sivan azari" initials="sa" lastIdx="16" clrIdx="0">
     <p:extLst>
       <p:ext uri="{19B8F6BF-5375-455C-9EA6-DF929625EA0E}">
         <p15:presenceInfo xmlns:p15="http://schemas.microsoft.com/office/powerpoint/2012/main" userId="b97560f207bd7627" providerId="Windows Live"/>
@@ -230,6 +230,15 @@
       </p:ext>
     </p:extLst>
   </p:cm>
+  <p:cm authorId="1" dt="2020-12-23T13:00:05.329" idx="16">
+    <p:pos x="1340" y="1151"/>
+    <p:text/>
+    <p:extLst>
+      <p:ext uri="{C676402C-5697-4E1C-873F-D02D1690AC5C}">
+        <p15:threadingInfo xmlns:p15="http://schemas.microsoft.com/office/powerpoint/2012/main" timeZoneBias="-120"/>
+      </p:ext>
+    </p:extLst>
+  </p:cm>
 </p:cmLst>
 </file>
 
@@ -405,7 +414,7 @@
           <a:p>
             <a:fld id="{19D3E5D1-EFEA-45B8-A631-DE70A61783BA}" type="datetimeFigureOut">
               <a:rPr lang="he-IL" smtClean="0"/>
-              <a:t>ו'/טבת/תשפ"א</a:t>
+              <a:t>ח'/טבת/תשפ"א</a:t>
             </a:fld>
             <a:endParaRPr lang="he-IL"/>
           </a:p>
@@ -605,7 +614,7 @@
           <a:p>
             <a:fld id="{19D3E5D1-EFEA-45B8-A631-DE70A61783BA}" type="datetimeFigureOut">
               <a:rPr lang="he-IL" smtClean="0"/>
-              <a:t>ו'/טבת/תשפ"א</a:t>
+              <a:t>ח'/טבת/תשפ"א</a:t>
             </a:fld>
             <a:endParaRPr lang="he-IL"/>
           </a:p>
@@ -815,7 +824,7 @@
           <a:p>
             <a:fld id="{19D3E5D1-EFEA-45B8-A631-DE70A61783BA}" type="datetimeFigureOut">
               <a:rPr lang="he-IL" smtClean="0"/>
-              <a:t>ו'/טבת/תשפ"א</a:t>
+              <a:t>ח'/טבת/תשפ"א</a:t>
             </a:fld>
             <a:endParaRPr lang="he-IL"/>
           </a:p>
@@ -1015,7 +1024,7 @@
           <a:p>
             <a:fld id="{19D3E5D1-EFEA-45B8-A631-DE70A61783BA}" type="datetimeFigureOut">
               <a:rPr lang="he-IL" smtClean="0"/>
-              <a:t>ו'/טבת/תשפ"א</a:t>
+              <a:t>ח'/טבת/תשפ"א</a:t>
             </a:fld>
             <a:endParaRPr lang="he-IL"/>
           </a:p>
@@ -1291,7 +1300,7 @@
           <a:p>
             <a:fld id="{19D3E5D1-EFEA-45B8-A631-DE70A61783BA}" type="datetimeFigureOut">
               <a:rPr lang="he-IL" smtClean="0"/>
-              <a:t>ו'/טבת/תשפ"א</a:t>
+              <a:t>ח'/טבת/תשפ"א</a:t>
             </a:fld>
             <a:endParaRPr lang="he-IL"/>
           </a:p>
@@ -1559,7 +1568,7 @@
           <a:p>
             <a:fld id="{19D3E5D1-EFEA-45B8-A631-DE70A61783BA}" type="datetimeFigureOut">
               <a:rPr lang="he-IL" smtClean="0"/>
-              <a:t>ו'/טבת/תשפ"א</a:t>
+              <a:t>ח'/טבת/תשפ"א</a:t>
             </a:fld>
             <a:endParaRPr lang="he-IL"/>
           </a:p>
@@ -1974,7 +1983,7 @@
           <a:p>
             <a:fld id="{19D3E5D1-EFEA-45B8-A631-DE70A61783BA}" type="datetimeFigureOut">
               <a:rPr lang="he-IL" smtClean="0"/>
-              <a:t>ו'/טבת/תשפ"א</a:t>
+              <a:t>ח'/טבת/תשפ"א</a:t>
             </a:fld>
             <a:endParaRPr lang="he-IL"/>
           </a:p>
@@ -2116,7 +2125,7 @@
           <a:p>
             <a:fld id="{19D3E5D1-EFEA-45B8-A631-DE70A61783BA}" type="datetimeFigureOut">
               <a:rPr lang="he-IL" smtClean="0"/>
-              <a:t>ו'/טבת/תשפ"א</a:t>
+              <a:t>ח'/טבת/תשפ"א</a:t>
             </a:fld>
             <a:endParaRPr lang="he-IL"/>
           </a:p>
@@ -2229,7 +2238,7 @@
           <a:p>
             <a:fld id="{19D3E5D1-EFEA-45B8-A631-DE70A61783BA}" type="datetimeFigureOut">
               <a:rPr lang="he-IL" smtClean="0"/>
-              <a:t>ו'/טבת/תשפ"א</a:t>
+              <a:t>ח'/טבת/תשפ"א</a:t>
             </a:fld>
             <a:endParaRPr lang="he-IL"/>
           </a:p>
@@ -2542,7 +2551,7 @@
           <a:p>
             <a:fld id="{19D3E5D1-EFEA-45B8-A631-DE70A61783BA}" type="datetimeFigureOut">
               <a:rPr lang="he-IL" smtClean="0"/>
-              <a:t>ו'/טבת/תשפ"א</a:t>
+              <a:t>ח'/טבת/תשפ"א</a:t>
             </a:fld>
             <a:endParaRPr lang="he-IL"/>
           </a:p>
@@ -2831,7 +2840,7 @@
           <a:p>
             <a:fld id="{19D3E5D1-EFEA-45B8-A631-DE70A61783BA}" type="datetimeFigureOut">
               <a:rPr lang="he-IL" smtClean="0"/>
-              <a:t>ו'/טבת/תשפ"א</a:t>
+              <a:t>ח'/טבת/תשפ"א</a:t>
             </a:fld>
             <a:endParaRPr lang="he-IL"/>
           </a:p>
@@ -3074,7 +3083,7 @@
           <a:p>
             <a:fld id="{19D3E5D1-EFEA-45B8-A631-DE70A61783BA}" type="datetimeFigureOut">
               <a:rPr lang="he-IL" smtClean="0"/>
-              <a:t>ו'/טבת/תשפ"א</a:t>
+              <a:t>ח'/טבת/תשפ"א</a:t>
             </a:fld>
             <a:endParaRPr lang="he-IL"/>
           </a:p>
@@ -3506,14 +3515,14 @@
           <p:nvPr>
             <p:extLst>
               <p:ext uri="{D42A27DB-BD31-4B8C-83A1-F6EECF244321}">
-                <p14:modId xmlns:p14="http://schemas.microsoft.com/office/powerpoint/2010/main" val="3094462905"/>
+                <p14:modId xmlns:p14="http://schemas.microsoft.com/office/powerpoint/2010/main" val="46133458"/>
               </p:ext>
             </p:extLst>
           </p:nvPr>
         </p:nvGraphicFramePr>
         <p:xfrm>
           <a:off x="78051" y="55299"/>
-          <a:ext cx="4224505" cy="1747520"/>
+          <a:ext cx="4224505" cy="2170322"/>
         </p:xfrm>
         <a:graphic>
           <a:graphicData uri="http://schemas.openxmlformats.org/drawingml/2006/table">
@@ -3640,7 +3649,7 @@
                   </a:ext>
                 </a:extLst>
               </a:tr>
-              <a:tr h="370840">
+              <a:tr h="396821">
                 <a:tc>
                   <a:txBody>
                     <a:bodyPr/>
@@ -3663,6 +3672,36 @@
                 <a:extLst>
                   <a:ext uri="{0D108BD9-81ED-4DB2-BD59-A6C34878D82A}">
                     <a16:rowId xmlns:a16="http://schemas.microsoft.com/office/drawing/2014/main" val="2010211074"/>
+                  </a:ext>
+                </a:extLst>
+              </a:tr>
+              <a:tr h="396821">
+                <a:tc>
+                  <a:txBody>
+                    <a:bodyPr/>
+                    <a:lstStyle/>
+                    <a:p>
+                      <a:pPr rtl="1"/>
+                      <a:r>
+                        <a:rPr lang="en-US" dirty="0"/>
+                        <a:t>Upload(</a:t>
+                      </a:r>
+                      <a:r>
+                        <a:rPr lang="en-US" dirty="0" err="1"/>
+                        <a:t>userid</a:t>
+                      </a:r>
+                      <a:r>
+                        <a:rPr lang="en-US" dirty="0"/>
+                        <a:t>) </a:t>
+                      </a:r>
+                      <a:endParaRPr lang="he-IL" dirty="0"/>
+                    </a:p>
+                  </a:txBody>
+                  <a:tcPr/>
+                </a:tc>
+                <a:extLst>
+                  <a:ext uri="{0D108BD9-81ED-4DB2-BD59-A6C34878D82A}">
+                    <a16:rowId xmlns:a16="http://schemas.microsoft.com/office/drawing/2014/main" val="3985210610"/>
                   </a:ext>
                 </a:extLst>
               </a:tr>

</xml_diff>

<commit_message>
started SDD document, created general look of the tables that will be in the database
</commit_message>
<xml_diff>
--- a/Separation to classes.pptx
+++ b/Separation to classes.pptx
@@ -115,7 +115,7 @@
 
 <file path=ppt/commentAuthors.xml><?xml version="1.0" encoding="utf-8"?>
 <p:cmAuthorLst xmlns:a="http://schemas.openxmlformats.org/drawingml/2006/main" xmlns:r="http://schemas.openxmlformats.org/officeDocument/2006/relationships" xmlns:p="http://schemas.openxmlformats.org/presentationml/2006/main">
-  <p:cmAuthor id="1" name="sivan azari" initials="sa" lastIdx="16" clrIdx="0">
+  <p:cmAuthor id="1" name="sivan azari" initials="sa" lastIdx="17" clrIdx="0">
     <p:extLst>
       <p:ext uri="{19B8F6BF-5375-455C-9EA6-DF929625EA0E}">
         <p15:presenceInfo xmlns:p15="http://schemas.microsoft.com/office/powerpoint/2012/main" userId="b97560f207bd7627" providerId="Windows Live"/>
@@ -232,7 +232,16 @@
   </p:cm>
   <p:cm authorId="1" dt="2020-12-23T13:00:05.329" idx="16">
     <p:pos x="1340" y="1151"/>
-    <p:text/>
+    <p:text>We can extract each recipe by SELECT * FROM Recipe WHERE userId= userID(that is useing the application now)</p:text>
+    <p:extLst>
+      <p:ext uri="{C676402C-5697-4E1C-873F-D02D1690AC5C}">
+        <p15:threadingInfo xmlns:p15="http://schemas.microsoft.com/office/powerpoint/2012/main" timeZoneBias="-120"/>
+      </p:ext>
+    </p:extLst>
+  </p:cm>
+  <p:cm authorId="1" dt="2021-01-05T14:29:17.435" idx="17">
+    <p:pos x="2124" y="3324"/>
+    <p:text>We can extract each daily or weekly..etc by SELECT * FROM daily WHERE userId= userID(that is useing the application now)</p:text>
     <p:extLst>
       <p:ext uri="{C676402C-5697-4E1C-873F-D02D1690AC5C}">
         <p15:threadingInfo xmlns:p15="http://schemas.microsoft.com/office/powerpoint/2012/main" timeZoneBias="-120"/>
@@ -414,7 +423,7 @@
           <a:p>
             <a:fld id="{19D3E5D1-EFEA-45B8-A631-DE70A61783BA}" type="datetimeFigureOut">
               <a:rPr lang="he-IL" smtClean="0"/>
-              <a:t>ח'/טבת/תשפ"א</a:t>
+              <a:t>כ"ב/טבת/תשפ"א</a:t>
             </a:fld>
             <a:endParaRPr lang="he-IL"/>
           </a:p>
@@ -614,7 +623,7 @@
           <a:p>
             <a:fld id="{19D3E5D1-EFEA-45B8-A631-DE70A61783BA}" type="datetimeFigureOut">
               <a:rPr lang="he-IL" smtClean="0"/>
-              <a:t>ח'/טבת/תשפ"א</a:t>
+              <a:t>כ"ב/טבת/תשפ"א</a:t>
             </a:fld>
             <a:endParaRPr lang="he-IL"/>
           </a:p>
@@ -824,7 +833,7 @@
           <a:p>
             <a:fld id="{19D3E5D1-EFEA-45B8-A631-DE70A61783BA}" type="datetimeFigureOut">
               <a:rPr lang="he-IL" smtClean="0"/>
-              <a:t>ח'/טבת/תשפ"א</a:t>
+              <a:t>כ"ב/טבת/תשפ"א</a:t>
             </a:fld>
             <a:endParaRPr lang="he-IL"/>
           </a:p>
@@ -1024,7 +1033,7 @@
           <a:p>
             <a:fld id="{19D3E5D1-EFEA-45B8-A631-DE70A61783BA}" type="datetimeFigureOut">
               <a:rPr lang="he-IL" smtClean="0"/>
-              <a:t>ח'/טבת/תשפ"א</a:t>
+              <a:t>כ"ב/טבת/תשפ"א</a:t>
             </a:fld>
             <a:endParaRPr lang="he-IL"/>
           </a:p>
@@ -1300,7 +1309,7 @@
           <a:p>
             <a:fld id="{19D3E5D1-EFEA-45B8-A631-DE70A61783BA}" type="datetimeFigureOut">
               <a:rPr lang="he-IL" smtClean="0"/>
-              <a:t>ח'/טבת/תשפ"א</a:t>
+              <a:t>כ"ב/טבת/תשפ"א</a:t>
             </a:fld>
             <a:endParaRPr lang="he-IL"/>
           </a:p>
@@ -1568,7 +1577,7 @@
           <a:p>
             <a:fld id="{19D3E5D1-EFEA-45B8-A631-DE70A61783BA}" type="datetimeFigureOut">
               <a:rPr lang="he-IL" smtClean="0"/>
-              <a:t>ח'/טבת/תשפ"א</a:t>
+              <a:t>כ"ב/טבת/תשפ"א</a:t>
             </a:fld>
             <a:endParaRPr lang="he-IL"/>
           </a:p>
@@ -1983,7 +1992,7 @@
           <a:p>
             <a:fld id="{19D3E5D1-EFEA-45B8-A631-DE70A61783BA}" type="datetimeFigureOut">
               <a:rPr lang="he-IL" smtClean="0"/>
-              <a:t>ח'/טבת/תשפ"א</a:t>
+              <a:t>כ"ב/טבת/תשפ"א</a:t>
             </a:fld>
             <a:endParaRPr lang="he-IL"/>
           </a:p>
@@ -2125,7 +2134,7 @@
           <a:p>
             <a:fld id="{19D3E5D1-EFEA-45B8-A631-DE70A61783BA}" type="datetimeFigureOut">
               <a:rPr lang="he-IL" smtClean="0"/>
-              <a:t>ח'/טבת/תשפ"א</a:t>
+              <a:t>כ"ב/טבת/תשפ"א</a:t>
             </a:fld>
             <a:endParaRPr lang="he-IL"/>
           </a:p>
@@ -2238,7 +2247,7 @@
           <a:p>
             <a:fld id="{19D3E5D1-EFEA-45B8-A631-DE70A61783BA}" type="datetimeFigureOut">
               <a:rPr lang="he-IL" smtClean="0"/>
-              <a:t>ח'/טבת/תשפ"א</a:t>
+              <a:t>כ"ב/טבת/תשפ"א</a:t>
             </a:fld>
             <a:endParaRPr lang="he-IL"/>
           </a:p>
@@ -2551,7 +2560,7 @@
           <a:p>
             <a:fld id="{19D3E5D1-EFEA-45B8-A631-DE70A61783BA}" type="datetimeFigureOut">
               <a:rPr lang="he-IL" smtClean="0"/>
-              <a:t>ח'/טבת/תשפ"א</a:t>
+              <a:t>כ"ב/טבת/תשפ"א</a:t>
             </a:fld>
             <a:endParaRPr lang="he-IL"/>
           </a:p>
@@ -2840,7 +2849,7 @@
           <a:p>
             <a:fld id="{19D3E5D1-EFEA-45B8-A631-DE70A61783BA}" type="datetimeFigureOut">
               <a:rPr lang="he-IL" smtClean="0"/>
-              <a:t>ח'/טבת/תשפ"א</a:t>
+              <a:t>כ"ב/טבת/תשפ"א</a:t>
             </a:fld>
             <a:endParaRPr lang="he-IL"/>
           </a:p>
@@ -3083,7 +3092,7 @@
           <a:p>
             <a:fld id="{19D3E5D1-EFEA-45B8-A631-DE70A61783BA}" type="datetimeFigureOut">
               <a:rPr lang="he-IL" smtClean="0"/>
-              <a:t>ח'/טבת/תשפ"א</a:t>
+              <a:t>כ"ב/טבת/תשפ"א</a:t>
             </a:fld>
             <a:endParaRPr lang="he-IL"/>
           </a:p>
@@ -4525,14 +4534,14 @@
           <p:nvPr>
             <p:extLst>
               <p:ext uri="{D42A27DB-BD31-4B8C-83A1-F6EECF244321}">
-                <p14:modId xmlns:p14="http://schemas.microsoft.com/office/powerpoint/2010/main" val="4085657951"/>
+                <p14:modId xmlns:p14="http://schemas.microsoft.com/office/powerpoint/2010/main" val="3065771315"/>
               </p:ext>
             </p:extLst>
           </p:nvPr>
         </p:nvGraphicFramePr>
         <p:xfrm>
           <a:off x="5229348" y="4942878"/>
-          <a:ext cx="1903829" cy="1157041"/>
+          <a:ext cx="1903829" cy="1551001"/>
         </p:xfrm>
         <a:graphic>
           <a:graphicData uri="http://schemas.openxmlformats.org/drawingml/2006/table">
@@ -4568,6 +4577,27 @@
                 <a:extLst>
                   <a:ext uri="{0D108BD9-81ED-4DB2-BD59-A6C34878D82A}">
                     <a16:rowId xmlns:a16="http://schemas.microsoft.com/office/drawing/2014/main" val="2854820626"/>
+                  </a:ext>
+                </a:extLst>
+              </a:tr>
+              <a:tr h="393960">
+                <a:tc>
+                  <a:txBody>
+                    <a:bodyPr/>
+                    <a:lstStyle/>
+                    <a:p>
+                      <a:pPr rtl="1"/>
+                      <a:r>
+                        <a:rPr lang="en-US" dirty="0"/>
+                        <a:t>ID</a:t>
+                      </a:r>
+                    </a:p>
+                  </a:txBody>
+                  <a:tcPr/>
+                </a:tc>
+                <a:extLst>
+                  <a:ext uri="{0D108BD9-81ED-4DB2-BD59-A6C34878D82A}">
+                    <a16:rowId xmlns:a16="http://schemas.microsoft.com/office/drawing/2014/main" val="2181690575"/>
                   </a:ext>
                 </a:extLst>
               </a:tr>
@@ -4649,14 +4679,14 @@
           <p:nvPr>
             <p:extLst>
               <p:ext uri="{D42A27DB-BD31-4B8C-83A1-F6EECF244321}">
-                <p14:modId xmlns:p14="http://schemas.microsoft.com/office/powerpoint/2010/main" val="459538763"/>
+                <p14:modId xmlns:p14="http://schemas.microsoft.com/office/powerpoint/2010/main" val="1006398168"/>
               </p:ext>
             </p:extLst>
           </p:nvPr>
         </p:nvGraphicFramePr>
         <p:xfrm>
           <a:off x="7496903" y="4916774"/>
-          <a:ext cx="2078893" cy="1207984"/>
+          <a:ext cx="2078893" cy="1601944"/>
         </p:xfrm>
         <a:graphic>
           <a:graphicData uri="http://schemas.openxmlformats.org/drawingml/2006/table">
@@ -4692,6 +4722,28 @@
                 <a:extLst>
                   <a:ext uri="{0D108BD9-81ED-4DB2-BD59-A6C34878D82A}">
                     <a16:rowId xmlns:a16="http://schemas.microsoft.com/office/drawing/2014/main" val="2854820626"/>
+                  </a:ext>
+                </a:extLst>
+              </a:tr>
+              <a:tr h="393960">
+                <a:tc>
+                  <a:txBody>
+                    <a:bodyPr/>
+                    <a:lstStyle/>
+                    <a:p>
+                      <a:pPr rtl="1"/>
+                      <a:r>
+                        <a:rPr lang="en-US" dirty="0"/>
+                        <a:t>ID</a:t>
+                      </a:r>
+                      <a:endParaRPr lang="he-IL" dirty="0"/>
+                    </a:p>
+                  </a:txBody>
+                  <a:tcPr/>
+                </a:tc>
+                <a:extLst>
+                  <a:ext uri="{0D108BD9-81ED-4DB2-BD59-A6C34878D82A}">
+                    <a16:rowId xmlns:a16="http://schemas.microsoft.com/office/drawing/2014/main" val="3440978261"/>
                   </a:ext>
                 </a:extLst>
               </a:tr>
@@ -4774,14 +4826,14 @@
           <p:nvPr>
             <p:extLst>
               <p:ext uri="{D42A27DB-BD31-4B8C-83A1-F6EECF244321}">
-                <p14:modId xmlns:p14="http://schemas.microsoft.com/office/powerpoint/2010/main" val="1650074618"/>
+                <p14:modId xmlns:p14="http://schemas.microsoft.com/office/powerpoint/2010/main" val="874260932"/>
               </p:ext>
             </p:extLst>
           </p:nvPr>
         </p:nvGraphicFramePr>
         <p:xfrm>
           <a:off x="2979519" y="4927868"/>
-          <a:ext cx="1903828" cy="1190422"/>
+          <a:ext cx="1903828" cy="1556182"/>
         </p:xfrm>
         <a:graphic>
           <a:graphicData uri="http://schemas.openxmlformats.org/drawingml/2006/table">
@@ -4828,6 +4880,27 @@
                     <a:p>
                       <a:pPr rtl="1"/>
                       <a:r>
+                        <a:rPr lang="en-US" dirty="0"/>
+                        <a:t>ID</a:t>
+                      </a:r>
+                    </a:p>
+                  </a:txBody>
+                  <a:tcPr/>
+                </a:tc>
+                <a:extLst>
+                  <a:ext uri="{0D108BD9-81ED-4DB2-BD59-A6C34878D82A}">
+                    <a16:rowId xmlns:a16="http://schemas.microsoft.com/office/drawing/2014/main" val="4077253306"/>
+                  </a:ext>
+                </a:extLst>
+              </a:tr>
+              <a:tr h="323380">
+                <a:tc>
+                  <a:txBody>
+                    <a:bodyPr/>
+                    <a:lstStyle/>
+                    <a:p>
+                      <a:pPr rtl="1"/>
+                      <a:r>
                         <a:rPr lang="en-US" dirty="0" err="1"/>
                         <a:t>ArrayList</a:t>
                       </a:r>
@@ -4886,14 +4959,14 @@
           <p:nvPr>
             <p:extLst>
               <p:ext uri="{D42A27DB-BD31-4B8C-83A1-F6EECF244321}">
-                <p14:modId xmlns:p14="http://schemas.microsoft.com/office/powerpoint/2010/main" val="2518289625"/>
+                <p14:modId xmlns:p14="http://schemas.microsoft.com/office/powerpoint/2010/main" val="2864024110"/>
               </p:ext>
             </p:extLst>
           </p:nvPr>
         </p:nvGraphicFramePr>
         <p:xfrm>
           <a:off x="9939522" y="4912878"/>
-          <a:ext cx="2078893" cy="1181880"/>
+          <a:ext cx="2078893" cy="1575840"/>
         </p:xfrm>
         <a:graphic>
           <a:graphicData uri="http://schemas.openxmlformats.org/drawingml/2006/table">
@@ -4929,6 +5002,28 @@
                 <a:extLst>
                   <a:ext uri="{0D108BD9-81ED-4DB2-BD59-A6C34878D82A}">
                     <a16:rowId xmlns:a16="http://schemas.microsoft.com/office/drawing/2014/main" val="2854820626"/>
+                  </a:ext>
+                </a:extLst>
+              </a:tr>
+              <a:tr h="393960">
+                <a:tc>
+                  <a:txBody>
+                    <a:bodyPr/>
+                    <a:lstStyle/>
+                    <a:p>
+                      <a:pPr rtl="1"/>
+                      <a:r>
+                        <a:rPr lang="en-US" dirty="0"/>
+                        <a:t>ID</a:t>
+                      </a:r>
+                      <a:endParaRPr lang="he-IL" dirty="0"/>
+                    </a:p>
+                  </a:txBody>
+                  <a:tcPr/>
+                </a:tc>
+                <a:extLst>
+                  <a:ext uri="{0D108BD9-81ED-4DB2-BD59-A6C34878D82A}">
+                    <a16:rowId xmlns:a16="http://schemas.microsoft.com/office/drawing/2014/main" val="2855099598"/>
                   </a:ext>
                 </a:extLst>
               </a:tr>
@@ -5162,14 +5257,14 @@
           <p:nvPr>
             <p:extLst>
               <p:ext uri="{D42A27DB-BD31-4B8C-83A1-F6EECF244321}">
-                <p14:modId xmlns:p14="http://schemas.microsoft.com/office/powerpoint/2010/main" val="3057715454"/>
+                <p14:modId xmlns:p14="http://schemas.microsoft.com/office/powerpoint/2010/main" val="379837093"/>
               </p:ext>
             </p:extLst>
           </p:nvPr>
         </p:nvGraphicFramePr>
         <p:xfrm>
           <a:off x="3850190" y="773113"/>
-          <a:ext cx="3679869" cy="2961640"/>
+          <a:ext cx="3679869" cy="3332480"/>
         </p:xfrm>
         <a:graphic>
           <a:graphicData uri="http://schemas.openxmlformats.org/drawingml/2006/table">
@@ -5205,6 +5300,28 @@
                 <a:extLst>
                   <a:ext uri="{0D108BD9-81ED-4DB2-BD59-A6C34878D82A}">
                     <a16:rowId xmlns:a16="http://schemas.microsoft.com/office/drawing/2014/main" val="2854820626"/>
+                  </a:ext>
+                </a:extLst>
+              </a:tr>
+              <a:tr h="370840">
+                <a:tc>
+                  <a:txBody>
+                    <a:bodyPr/>
+                    <a:lstStyle/>
+                    <a:p>
+                      <a:pPr rtl="1"/>
+                      <a:r>
+                        <a:rPr lang="en-US" dirty="0"/>
+                        <a:t>Id</a:t>
+                      </a:r>
+                      <a:endParaRPr lang="he-IL" dirty="0"/>
+                    </a:p>
+                  </a:txBody>
+                  <a:tcPr/>
+                </a:tc>
+                <a:extLst>
+                  <a:ext uri="{0D108BD9-81ED-4DB2-BD59-A6C34878D82A}">
+                    <a16:rowId xmlns:a16="http://schemas.microsoft.com/office/drawing/2014/main" val="3616986267"/>
                   </a:ext>
                 </a:extLst>
               </a:tr>

</xml_diff>